<commit_message>
Trying to fix monte_carlo for one optimal backboard angle
</commit_message>
<xml_diff>
--- a/Weekly Presentations/Week 4.pptx
+++ b/Weekly Presentations/Week 4.pptx
@@ -7,11 +7,10 @@
   <p:sldIdLst>
     <p:sldId id="256" r:id="rId2"/>
     <p:sldId id="257" r:id="rId3"/>
-    <p:sldId id="258" r:id="rId4"/>
-    <p:sldId id="259" r:id="rId5"/>
-    <p:sldId id="260" r:id="rId6"/>
-    <p:sldId id="261" r:id="rId7"/>
-    <p:sldId id="262" r:id="rId8"/>
+    <p:sldId id="259" r:id="rId4"/>
+    <p:sldId id="260" r:id="rId5"/>
+    <p:sldId id="261" r:id="rId6"/>
+    <p:sldId id="262" r:id="rId7"/>
   </p:sldIdLst>
   <p:sldSz cx="12192000" cy="6858000"/>
   <p:notesSz cx="6858000" cy="9144000"/>
@@ -267,7 +266,7 @@
           <a:p>
             <a:fld id="{4E8362BC-3245-084B-938D-D8BDF2D5292F}" type="datetimeFigureOut">
               <a:rPr lang="en-US" smtClean="0"/>
-              <a:t>9/15/20</a:t>
+              <a:t>9/16/20</a:t>
             </a:fld>
             <a:endParaRPr lang="en-US"/>
           </a:p>
@@ -467,7 +466,7 @@
           <a:p>
             <a:fld id="{4E8362BC-3245-084B-938D-D8BDF2D5292F}" type="datetimeFigureOut">
               <a:rPr lang="en-US" smtClean="0"/>
-              <a:t>9/15/20</a:t>
+              <a:t>9/16/20</a:t>
             </a:fld>
             <a:endParaRPr lang="en-US"/>
           </a:p>
@@ -677,7 +676,7 @@
           <a:p>
             <a:fld id="{4E8362BC-3245-084B-938D-D8BDF2D5292F}" type="datetimeFigureOut">
               <a:rPr lang="en-US" smtClean="0"/>
-              <a:t>9/15/20</a:t>
+              <a:t>9/16/20</a:t>
             </a:fld>
             <a:endParaRPr lang="en-US"/>
           </a:p>
@@ -877,7 +876,7 @@
           <a:p>
             <a:fld id="{4E8362BC-3245-084B-938D-D8BDF2D5292F}" type="datetimeFigureOut">
               <a:rPr lang="en-US" smtClean="0"/>
-              <a:t>9/15/20</a:t>
+              <a:t>9/16/20</a:t>
             </a:fld>
             <a:endParaRPr lang="en-US"/>
           </a:p>
@@ -1153,7 +1152,7 @@
           <a:p>
             <a:fld id="{4E8362BC-3245-084B-938D-D8BDF2D5292F}" type="datetimeFigureOut">
               <a:rPr lang="en-US" smtClean="0"/>
-              <a:t>9/15/20</a:t>
+              <a:t>9/16/20</a:t>
             </a:fld>
             <a:endParaRPr lang="en-US"/>
           </a:p>
@@ -1421,7 +1420,7 @@
           <a:p>
             <a:fld id="{4E8362BC-3245-084B-938D-D8BDF2D5292F}" type="datetimeFigureOut">
               <a:rPr lang="en-US" smtClean="0"/>
-              <a:t>9/15/20</a:t>
+              <a:t>9/16/20</a:t>
             </a:fld>
             <a:endParaRPr lang="en-US"/>
           </a:p>
@@ -1836,7 +1835,7 @@
           <a:p>
             <a:fld id="{4E8362BC-3245-084B-938D-D8BDF2D5292F}" type="datetimeFigureOut">
               <a:rPr lang="en-US" smtClean="0"/>
-              <a:t>9/15/20</a:t>
+              <a:t>9/16/20</a:t>
             </a:fld>
             <a:endParaRPr lang="en-US"/>
           </a:p>
@@ -1978,7 +1977,7 @@
           <a:p>
             <a:fld id="{4E8362BC-3245-084B-938D-D8BDF2D5292F}" type="datetimeFigureOut">
               <a:rPr lang="en-US" smtClean="0"/>
-              <a:t>9/15/20</a:t>
+              <a:t>9/16/20</a:t>
             </a:fld>
             <a:endParaRPr lang="en-US"/>
           </a:p>
@@ -2091,7 +2090,7 @@
           <a:p>
             <a:fld id="{4E8362BC-3245-084B-938D-D8BDF2D5292F}" type="datetimeFigureOut">
               <a:rPr lang="en-US" smtClean="0"/>
-              <a:t>9/15/20</a:t>
+              <a:t>9/16/20</a:t>
             </a:fld>
             <a:endParaRPr lang="en-US"/>
           </a:p>
@@ -2404,7 +2403,7 @@
           <a:p>
             <a:fld id="{4E8362BC-3245-084B-938D-D8BDF2D5292F}" type="datetimeFigureOut">
               <a:rPr lang="en-US" smtClean="0"/>
-              <a:t>9/15/20</a:t>
+              <a:t>9/16/20</a:t>
             </a:fld>
             <a:endParaRPr lang="en-US"/>
           </a:p>
@@ -2693,7 +2692,7 @@
           <a:p>
             <a:fld id="{4E8362BC-3245-084B-938D-D8BDF2D5292F}" type="datetimeFigureOut">
               <a:rPr lang="en-US" smtClean="0"/>
-              <a:t>9/15/20</a:t>
+              <a:t>9/16/20</a:t>
             </a:fld>
             <a:endParaRPr lang="en-US"/>
           </a:p>
@@ -2936,7 +2935,7 @@
           <a:p>
             <a:fld id="{4E8362BC-3245-084B-938D-D8BDF2D5292F}" type="datetimeFigureOut">
               <a:rPr lang="en-US" smtClean="0"/>
-              <a:t>9/15/20</a:t>
+              <a:t>9/16/20</a:t>
             </a:fld>
             <a:endParaRPr lang="en-US"/>
           </a:p>
@@ -3490,7 +3489,53 @@
           <a:p>
             <a:r>
               <a:rPr lang="en-US" dirty="0"/>
-              <a:t>Tried to optimize the angle of the backboard for a number of different shots</a:t>
+              <a:t>Tried to optimize the angle of the backboard for a number of different shots </a:t>
+            </a:r>
+            <a:r>
+              <a:rPr lang="en-US" dirty="0">
+                <a:sym typeface="Wingdings" pitchFamily="2" charset="2"/>
+              </a:rPr>
+              <a:t> this is still a work in progress</a:t>
+            </a:r>
+          </a:p>
+          <a:p>
+            <a:r>
+              <a:rPr lang="en-US" dirty="0">
+                <a:sym typeface="Wingdings" pitchFamily="2" charset="2"/>
+              </a:rPr>
+              <a:t>Some debugging on the </a:t>
+            </a:r>
+            <a:r>
+              <a:rPr lang="en-US" dirty="0" err="1">
+                <a:sym typeface="Wingdings" pitchFamily="2" charset="2"/>
+              </a:rPr>
+              <a:t>two_d_shot.py</a:t>
+            </a:r>
+            <a:r>
+              <a:rPr lang="en-US" dirty="0">
+                <a:sym typeface="Wingdings" pitchFamily="2" charset="2"/>
+              </a:rPr>
+              <a:t> file to make sure everything was working with the tolerance and the radius of the basketball</a:t>
+            </a:r>
+          </a:p>
+          <a:p>
+            <a:r>
+              <a:rPr lang="en-US" dirty="0">
+                <a:sym typeface="Wingdings" pitchFamily="2" charset="2"/>
+              </a:rPr>
+              <a:t>Lots of debugging in the monte </a:t>
+            </a:r>
+            <a:r>
+              <a:rPr lang="en-US" dirty="0" err="1">
+                <a:sym typeface="Wingdings" pitchFamily="2" charset="2"/>
+              </a:rPr>
+              <a:t>carlo</a:t>
+            </a:r>
+            <a:r>
+              <a:rPr lang="en-US" dirty="0">
+                <a:sym typeface="Wingdings" pitchFamily="2" charset="2"/>
+              </a:rPr>
+              <a:t> file to make sense of every line and check that it does what I want it to do</a:t>
             </a:r>
           </a:p>
         </p:txBody>
@@ -3509,89 +3554,6 @@
 </file>
 
 <file path=ppt/slides/slide3.xml><?xml version="1.0" encoding="utf-8"?>
-<p:sld xmlns:a="http://schemas.openxmlformats.org/drawingml/2006/main" xmlns:r="http://schemas.openxmlformats.org/officeDocument/2006/relationships" xmlns:p="http://schemas.openxmlformats.org/presentationml/2006/main">
-  <p:cSld>
-    <p:spTree>
-      <p:nvGrpSpPr>
-        <p:cNvPr id="1" name=""/>
-        <p:cNvGrpSpPr/>
-        <p:nvPr/>
-      </p:nvGrpSpPr>
-      <p:grpSpPr>
-        <a:xfrm>
-          <a:off x="0" y="0"/>
-          <a:ext cx="0" cy="0"/>
-          <a:chOff x="0" y="0"/>
-          <a:chExt cx="0" cy="0"/>
-        </a:xfrm>
-      </p:grpSpPr>
-      <p:sp>
-        <p:nvSpPr>
-          <p:cNvPr id="2" name="Title 1">
-            <a:extLst>
-              <a:ext uri="{FF2B5EF4-FFF2-40B4-BE49-F238E27FC236}">
-                <a16:creationId xmlns:a16="http://schemas.microsoft.com/office/drawing/2014/main" id="{40D4C9A0-57D8-3D4E-BCC3-B2CCE4EA7EDB}"/>
-              </a:ext>
-            </a:extLst>
-          </p:cNvPr>
-          <p:cNvSpPr>
-            <a:spLocks noGrp="1"/>
-          </p:cNvSpPr>
-          <p:nvPr>
-            <p:ph type="title"/>
-          </p:nvPr>
-        </p:nvSpPr>
-        <p:spPr/>
-        <p:txBody>
-          <a:bodyPr/>
-          <a:lstStyle/>
-          <a:p>
-            <a:r>
-              <a:rPr lang="en-US" dirty="0"/>
-              <a:t>What Worked</a:t>
-            </a:r>
-          </a:p>
-        </p:txBody>
-      </p:sp>
-      <p:sp>
-        <p:nvSpPr>
-          <p:cNvPr id="3" name="Content Placeholder 2">
-            <a:extLst>
-              <a:ext uri="{FF2B5EF4-FFF2-40B4-BE49-F238E27FC236}">
-                <a16:creationId xmlns:a16="http://schemas.microsoft.com/office/drawing/2014/main" id="{8D12A012-E8B3-034A-B04A-16988ACFEBFC}"/>
-              </a:ext>
-            </a:extLst>
-          </p:cNvPr>
-          <p:cNvSpPr>
-            <a:spLocks noGrp="1"/>
-          </p:cNvSpPr>
-          <p:nvPr>
-            <p:ph idx="1"/>
-          </p:nvPr>
-        </p:nvSpPr>
-        <p:spPr/>
-        <p:txBody>
-          <a:bodyPr/>
-          <a:lstStyle/>
-          <a:p>
-            <a:endParaRPr lang="en-US"/>
-          </a:p>
-        </p:txBody>
-      </p:sp>
-    </p:spTree>
-    <p:extLst>
-      <p:ext uri="{BB962C8B-B14F-4D97-AF65-F5344CB8AC3E}">
-        <p14:creationId xmlns:p14="http://schemas.microsoft.com/office/powerpoint/2010/main" val="3977822011"/>
-      </p:ext>
-    </p:extLst>
-  </p:cSld>
-  <p:clrMapOvr>
-    <a:masterClrMapping/>
-  </p:clrMapOvr>
-</p:sld>
-</file>
-
-<file path=ppt/slides/slide4.xml><?xml version="1.0" encoding="utf-8"?>
 <p:sld xmlns:a="http://schemas.openxmlformats.org/drawingml/2006/main" xmlns:r="http://schemas.openxmlformats.org/officeDocument/2006/relationships" xmlns:p="http://schemas.openxmlformats.org/presentationml/2006/main">
   <p:cSld>
     <p:spTree>
@@ -3737,6 +3699,133 @@
 </p:sld>
 </file>
 
+<file path=ppt/slides/slide4.xml><?xml version="1.0" encoding="utf-8"?>
+<p:sld xmlns:a="http://schemas.openxmlformats.org/drawingml/2006/main" xmlns:r="http://schemas.openxmlformats.org/officeDocument/2006/relationships" xmlns:p="http://schemas.openxmlformats.org/presentationml/2006/main">
+  <p:cSld>
+    <p:spTree>
+      <p:nvGrpSpPr>
+        <p:cNvPr id="1" name=""/>
+        <p:cNvGrpSpPr/>
+        <p:nvPr/>
+      </p:nvGrpSpPr>
+      <p:grpSpPr>
+        <a:xfrm>
+          <a:off x="0" y="0"/>
+          <a:ext cx="0" cy="0"/>
+          <a:chOff x="0" y="0"/>
+          <a:chExt cx="0" cy="0"/>
+        </a:xfrm>
+      </p:grpSpPr>
+      <p:sp>
+        <p:nvSpPr>
+          <p:cNvPr id="2" name="Title 1">
+            <a:extLst>
+              <a:ext uri="{FF2B5EF4-FFF2-40B4-BE49-F238E27FC236}">
+                <a16:creationId xmlns:a16="http://schemas.microsoft.com/office/drawing/2014/main" id="{5283AB28-6EB9-8E49-89B2-DEBFEE7893D1}"/>
+              </a:ext>
+            </a:extLst>
+          </p:cNvPr>
+          <p:cNvSpPr>
+            <a:spLocks noGrp="1"/>
+          </p:cNvSpPr>
+          <p:nvPr>
+            <p:ph type="title"/>
+          </p:nvPr>
+        </p:nvSpPr>
+        <p:spPr/>
+        <p:txBody>
+          <a:bodyPr/>
+          <a:lstStyle/>
+          <a:p>
+            <a:r>
+              <a:rPr lang="en-US" dirty="0"/>
+              <a:t>Where am I Stuck</a:t>
+            </a:r>
+          </a:p>
+        </p:txBody>
+      </p:sp>
+      <p:sp>
+        <p:nvSpPr>
+          <p:cNvPr id="3" name="Content Placeholder 2">
+            <a:extLst>
+              <a:ext uri="{FF2B5EF4-FFF2-40B4-BE49-F238E27FC236}">
+                <a16:creationId xmlns:a16="http://schemas.microsoft.com/office/drawing/2014/main" id="{4882B838-5F6B-E741-A1EA-9DE9BD5695DB}"/>
+              </a:ext>
+            </a:extLst>
+          </p:cNvPr>
+          <p:cNvSpPr>
+            <a:spLocks noGrp="1"/>
+          </p:cNvSpPr>
+          <p:nvPr>
+            <p:ph idx="1"/>
+          </p:nvPr>
+        </p:nvSpPr>
+        <p:spPr/>
+        <p:txBody>
+          <a:bodyPr/>
+          <a:lstStyle/>
+          <a:p>
+            <a:r>
+              <a:rPr lang="en-US" dirty="0"/>
+              <a:t>How to extend lines 114-115 in </a:t>
+            </a:r>
+            <a:r>
+              <a:rPr lang="en-US" dirty="0" err="1"/>
+              <a:t>two_d_shot.py</a:t>
+            </a:r>
+            <a:r>
+              <a:rPr lang="en-US" dirty="0"/>
+              <a:t> to 3D code because there are two variables that we’re testing</a:t>
+            </a:r>
+          </a:p>
+          <a:p>
+            <a:r>
+              <a:rPr lang="en-US" dirty="0"/>
+              <a:t>Got an error about the square root not existing in line 114 of </a:t>
+            </a:r>
+            <a:r>
+              <a:rPr lang="en-US" dirty="0" err="1"/>
+              <a:t>two_d_shot.py</a:t>
+            </a:r>
+            <a:r>
+              <a:rPr lang="en-US" dirty="0"/>
+              <a:t> but I put it in a try-except block and it still is having an error</a:t>
+            </a:r>
+          </a:p>
+          <a:p>
+            <a:r>
+              <a:rPr lang="en-US" dirty="0"/>
+              <a:t>Something’s wrong with my for loop in the monte </a:t>
+            </a:r>
+            <a:r>
+              <a:rPr lang="en-US" dirty="0" err="1"/>
+              <a:t>carlo</a:t>
+            </a:r>
+            <a:r>
+              <a:rPr lang="en-US" dirty="0"/>
+              <a:t> file – it only runs for the </a:t>
+            </a:r>
+            <a:r>
+              <a:rPr lang="en-US"/>
+              <a:t>first backboard angle</a:t>
+            </a:r>
+            <a:endParaRPr lang="en-US" dirty="0"/>
+          </a:p>
+        </p:txBody>
+      </p:sp>
+    </p:spTree>
+    <p:extLst>
+      <p:ext uri="{BB962C8B-B14F-4D97-AF65-F5344CB8AC3E}">
+        <p14:creationId xmlns:p14="http://schemas.microsoft.com/office/powerpoint/2010/main" val="925953612"/>
+      </p:ext>
+    </p:extLst>
+  </p:cSld>
+  <p:clrMapOvr>
+    <a:masterClrMapping/>
+  </p:clrMapOvr>
+</p:sld>
+</file>
+
 <file path=ppt/slides/slide5.xml><?xml version="1.0" encoding="utf-8"?>
 <p:sld xmlns:a="http://schemas.openxmlformats.org/drawingml/2006/main" xmlns:r="http://schemas.openxmlformats.org/officeDocument/2006/relationships" xmlns:p="http://schemas.openxmlformats.org/presentationml/2006/main">
   <p:cSld>
@@ -3759,89 +3848,6 @@
           <p:cNvPr id="2" name="Title 1">
             <a:extLst>
               <a:ext uri="{FF2B5EF4-FFF2-40B4-BE49-F238E27FC236}">
-                <a16:creationId xmlns:a16="http://schemas.microsoft.com/office/drawing/2014/main" id="{5283AB28-6EB9-8E49-89B2-DEBFEE7893D1}"/>
-              </a:ext>
-            </a:extLst>
-          </p:cNvPr>
-          <p:cNvSpPr>
-            <a:spLocks noGrp="1"/>
-          </p:cNvSpPr>
-          <p:nvPr>
-            <p:ph type="title"/>
-          </p:nvPr>
-        </p:nvSpPr>
-        <p:spPr/>
-        <p:txBody>
-          <a:bodyPr/>
-          <a:lstStyle/>
-          <a:p>
-            <a:r>
-              <a:rPr lang="en-US" dirty="0"/>
-              <a:t>Where am I Stuck</a:t>
-            </a:r>
-          </a:p>
-        </p:txBody>
-      </p:sp>
-      <p:sp>
-        <p:nvSpPr>
-          <p:cNvPr id="3" name="Content Placeholder 2">
-            <a:extLst>
-              <a:ext uri="{FF2B5EF4-FFF2-40B4-BE49-F238E27FC236}">
-                <a16:creationId xmlns:a16="http://schemas.microsoft.com/office/drawing/2014/main" id="{4882B838-5F6B-E741-A1EA-9DE9BD5695DB}"/>
-              </a:ext>
-            </a:extLst>
-          </p:cNvPr>
-          <p:cNvSpPr>
-            <a:spLocks noGrp="1"/>
-          </p:cNvSpPr>
-          <p:nvPr>
-            <p:ph idx="1"/>
-          </p:nvPr>
-        </p:nvSpPr>
-        <p:spPr/>
-        <p:txBody>
-          <a:bodyPr/>
-          <a:lstStyle/>
-          <a:p>
-            <a:endParaRPr lang="en-US"/>
-          </a:p>
-        </p:txBody>
-      </p:sp>
-    </p:spTree>
-    <p:extLst>
-      <p:ext uri="{BB962C8B-B14F-4D97-AF65-F5344CB8AC3E}">
-        <p14:creationId xmlns:p14="http://schemas.microsoft.com/office/powerpoint/2010/main" val="925953612"/>
-      </p:ext>
-    </p:extLst>
-  </p:cSld>
-  <p:clrMapOvr>
-    <a:masterClrMapping/>
-  </p:clrMapOvr>
-</p:sld>
-</file>
-
-<file path=ppt/slides/slide6.xml><?xml version="1.0" encoding="utf-8"?>
-<p:sld xmlns:a="http://schemas.openxmlformats.org/drawingml/2006/main" xmlns:r="http://schemas.openxmlformats.org/officeDocument/2006/relationships" xmlns:p="http://schemas.openxmlformats.org/presentationml/2006/main">
-  <p:cSld>
-    <p:spTree>
-      <p:nvGrpSpPr>
-        <p:cNvPr id="1" name=""/>
-        <p:cNvGrpSpPr/>
-        <p:nvPr/>
-      </p:nvGrpSpPr>
-      <p:grpSpPr>
-        <a:xfrm>
-          <a:off x="0" y="0"/>
-          <a:ext cx="0" cy="0"/>
-          <a:chOff x="0" y="0"/>
-          <a:chExt cx="0" cy="0"/>
-        </a:xfrm>
-      </p:grpSpPr>
-      <p:sp>
-        <p:nvSpPr>
-          <p:cNvPr id="2" name="Title 1">
-            <a:extLst>
-              <a:ext uri="{FF2B5EF4-FFF2-40B4-BE49-F238E27FC236}">
                 <a16:creationId xmlns:a16="http://schemas.microsoft.com/office/drawing/2014/main" id="{0F1CF9ED-6AEB-1643-B5EE-35B9B306DC44}"/>
               </a:ext>
             </a:extLst>
@@ -3890,6 +3896,31 @@
               <a:rPr lang="en-US" dirty="0"/>
               <a:t>Figure out energy lost by hitting the backboard (I’m just going to keep putting this in the slides, so I don’t forget)</a:t>
             </a:r>
+          </a:p>
+          <a:p>
+            <a:r>
+              <a:rPr lang="en-US" dirty="0"/>
+              <a:t>Extend 2D code to 3D code and make sure it’s working fully</a:t>
+            </a:r>
+          </a:p>
+          <a:p>
+            <a:r>
+              <a:rPr lang="en-US" dirty="0"/>
+              <a:t>Fix monte </a:t>
+            </a:r>
+            <a:r>
+              <a:rPr lang="en-US" dirty="0" err="1"/>
+              <a:t>carlo</a:t>
+            </a:r>
+            <a:r>
+              <a:rPr lang="en-US" dirty="0"/>
+              <a:t> simulation to actually have functions hit </a:t>
+            </a:r>
+            <a:r>
+              <a:rPr lang="en-US"/>
+              <a:t>the backboard and plot them</a:t>
+            </a:r>
+            <a:endParaRPr lang="en-US" dirty="0"/>
           </a:p>
           <a:p>
             <a:endParaRPr lang="en-US" dirty="0"/>
@@ -3909,7 +3940,7 @@
 </p:sld>
 </file>
 
-<file path=ppt/slides/slide7.xml><?xml version="1.0" encoding="utf-8"?>
+<file path=ppt/slides/slide6.xml><?xml version="1.0" encoding="utf-8"?>
 <p:sld xmlns:a="http://schemas.openxmlformats.org/drawingml/2006/main" xmlns:r="http://schemas.openxmlformats.org/officeDocument/2006/relationships" xmlns:p="http://schemas.openxmlformats.org/presentationml/2006/main">
   <p:cSld>
     <p:spTree>

</xml_diff>